<commit_message>
Update relational database design
</commit_message>
<xml_diff>
--- a/Core/Databases for Data Scientists Specialization/Relational Database Design /Week 5/ActiveGear_Presentation.pptx
+++ b/Core/Databases for Data Scientists Specialization/Relational Database Design /Week 5/ActiveGear_Presentation.pptx
@@ -8994,12 +8994,140 @@
           <a:chExt cx="0" cy="0"/>
         </a:xfrm>
       </p:grpSpPr>
+      <p:sp>
+        <p:nvSpPr>
+          <p:cNvPr id="23" name="Rectangle 22">
+            <a:extLst>
+              <a:ext uri="{FF2B5EF4-FFF2-40B4-BE49-F238E27FC236}">
+                <a16:creationId xmlns:a16="http://schemas.microsoft.com/office/drawing/2014/main" id="{94714483-7072-431F-9DBE-87F44E4D44BC}"/>
+              </a:ext>
+              <a:ext uri="{C183D7F6-B498-43B3-948B-1728B52AA6E4}">
+                <adec:decorative xmlns:adec="http://schemas.microsoft.com/office/drawing/2017/decorative" val="1"/>
+              </a:ext>
+            </a:extLst>
+          </p:cNvPr>
+          <p:cNvSpPr>
+            <a:spLocks noGrp="1" noRot="1" noChangeAspect="1" noMove="1" noResize="1" noEditPoints="1" noAdjustHandles="1" noChangeArrowheads="1" noChangeShapeType="1" noTextEdit="1"/>
+          </p:cNvSpPr>
+          <p:nvPr>
+            <p:extLst>
+              <p:ext uri="{386F3935-93C4-4BCD-93E2-E3B085C9AB24}">
+                <p16:designElem xmlns:p16="http://schemas.microsoft.com/office/powerpoint/2015/main" val="1"/>
+              </p:ext>
+            </p:extLst>
+          </p:nvPr>
+        </p:nvSpPr>
+        <p:spPr>
+          <a:xfrm>
+            <a:off x="2286" y="0"/>
+            <a:ext cx="9141714" cy="6858000"/>
+          </a:xfrm>
+          <a:prstGeom prst="rect">
+            <a:avLst/>
+          </a:prstGeom>
+          <a:solidFill>
+            <a:schemeClr val="tx2"/>
+          </a:solidFill>
+          <a:ln>
+            <a:noFill/>
+          </a:ln>
+        </p:spPr>
+        <p:style>
+          <a:lnRef idx="2">
+            <a:schemeClr val="accent1">
+              <a:shade val="50000"/>
+            </a:schemeClr>
+          </a:lnRef>
+          <a:fillRef idx="1">
+            <a:schemeClr val="accent1"/>
+          </a:fillRef>
+          <a:effectRef idx="0">
+            <a:schemeClr val="accent1"/>
+          </a:effectRef>
+          <a:fontRef idx="minor">
+            <a:schemeClr val="lt1"/>
+          </a:fontRef>
+        </p:style>
+        <p:txBody>
+          <a:bodyPr rtlCol="0" anchor="ctr"/>
+          <a:lstStyle/>
+          <a:p>
+            <a:pPr algn="ctr"/>
+            <a:endParaRPr lang="en-US"/>
+          </a:p>
+        </p:txBody>
+      </p:sp>
+      <p:sp>
+        <p:nvSpPr>
+          <p:cNvPr id="25" name="Rectangle 24">
+            <a:extLst>
+              <a:ext uri="{FF2B5EF4-FFF2-40B4-BE49-F238E27FC236}">
+                <a16:creationId xmlns:a16="http://schemas.microsoft.com/office/drawing/2014/main" id="{495892E1-F4A5-4991-AC52-4F417B14A2A2}"/>
+              </a:ext>
+              <a:ext uri="{C183D7F6-B498-43B3-948B-1728B52AA6E4}">
+                <adec:decorative xmlns:adec="http://schemas.microsoft.com/office/drawing/2017/decorative" val="1"/>
+              </a:ext>
+            </a:extLst>
+          </p:cNvPr>
+          <p:cNvSpPr>
+            <a:spLocks noGrp="1" noRot="1" noChangeAspect="1" noMove="1" noResize="1" noEditPoints="1" noAdjustHandles="1" noChangeArrowheads="1" noChangeShapeType="1" noTextEdit="1"/>
+          </p:cNvSpPr>
+          <p:nvPr>
+            <p:extLst>
+              <p:ext uri="{386F3935-93C4-4BCD-93E2-E3B085C9AB24}">
+                <p16:designElem xmlns:p16="http://schemas.microsoft.com/office/powerpoint/2015/main" val="1"/>
+              </p:ext>
+            </p:extLst>
+          </p:nvPr>
+        </p:nvSpPr>
+        <p:spPr>
+          <a:xfrm>
+            <a:off x="0" y="0"/>
+            <a:ext cx="9141714" cy="6858000"/>
+          </a:xfrm>
+          <a:prstGeom prst="rect">
+            <a:avLst/>
+          </a:prstGeom>
+          <a:solidFill>
+            <a:schemeClr val="tx1">
+              <a:alpha val="53000"/>
+            </a:schemeClr>
+          </a:solidFill>
+          <a:ln>
+            <a:noFill/>
+          </a:ln>
+        </p:spPr>
+        <p:style>
+          <a:lnRef idx="2">
+            <a:schemeClr val="accent1">
+              <a:shade val="50000"/>
+            </a:schemeClr>
+          </a:lnRef>
+          <a:fillRef idx="1">
+            <a:schemeClr val="accent1"/>
+          </a:fillRef>
+          <a:effectRef idx="0">
+            <a:schemeClr val="accent1"/>
+          </a:effectRef>
+          <a:fontRef idx="minor">
+            <a:schemeClr val="lt1"/>
+          </a:fontRef>
+        </p:style>
+        <p:txBody>
+          <a:bodyPr rtlCol="0" anchor="ctr"/>
+          <a:lstStyle/>
+          <a:p>
+            <a:pPr algn="ctr"/>
+            <a:endParaRPr lang="en-US"/>
+          </a:p>
+        </p:txBody>
+      </p:sp>
       <p:grpSp>
         <p:nvGrpSpPr>
-          <p:cNvPr id="15" name="Group 14">
+          <p:cNvPr id="27" name="Group 26">
             <a:extLst>
               <a:ext uri="{FF2B5EF4-FFF2-40B4-BE49-F238E27FC236}">
-                <a16:creationId xmlns:a16="http://schemas.microsoft.com/office/drawing/2014/main" id="{710FEF04-9FA2-4DD8-EC29-60D92C72296A}"/>
+                <a16:creationId xmlns:a16="http://schemas.microsoft.com/office/drawing/2014/main" id="{ACF597F8-76AA-44FA-8E6A-06223B66C0DD}"/>
               </a:ext>
               <a:ext uri="{C183D7F6-B498-43B3-948B-1728B52AA6E4}">
                 <adec:decorative xmlns:adec="http://schemas.microsoft.com/office/drawing/2017/decorative" val="1"/>
@@ -9019,18 +9147,18 @@
         </p:nvGrpSpPr>
         <p:grpSpPr>
           <a:xfrm>
-            <a:off x="3878883" y="-4329"/>
-            <a:ext cx="5265119" cy="6869586"/>
-            <a:chOff x="5171844" y="-11586"/>
-            <a:chExt cx="7020159" cy="6869586"/>
+            <a:off x="0" y="2075420"/>
+            <a:ext cx="9036544" cy="4093306"/>
+            <a:chOff x="1" y="2075420"/>
+            <a:chExt cx="12048729" cy="4093306"/>
           </a:xfrm>
         </p:grpSpPr>
         <p:sp>
           <p:nvSpPr>
-            <p:cNvPr id="10" name="Rectangle 9">
+            <p:cNvPr id="28" name="Oval 27">
               <a:extLst>
                 <a:ext uri="{FF2B5EF4-FFF2-40B4-BE49-F238E27FC236}">
-                  <a16:creationId xmlns:a16="http://schemas.microsoft.com/office/drawing/2014/main" id="{1B4A5D8B-34EC-D352-BE87-4809E4CE4F1E}"/>
+                  <a16:creationId xmlns:a16="http://schemas.microsoft.com/office/drawing/2014/main" id="{A6E12753-0A63-43EE-B28A-C989D033EADF}"/>
                 </a:ext>
                 <a:ext uri="{C183D7F6-B498-43B3-948B-1728B52AA6E4}">
                   <adec:decorative xmlns:adec="http://schemas.microsoft.com/office/drawing/2017/decorative" val="1"/>
@@ -9047,23 +9175,183 @@
             </p:nvPr>
           </p:nvSpPr>
           <p:spPr>
-            <a:xfrm>
-              <a:off x="5171848" y="-11580"/>
-              <a:ext cx="7020152" cy="6869579"/>
+            <a:xfrm rot="4500000">
+              <a:off x="7942191" y="2507571"/>
+              <a:ext cx="3563871" cy="3563871"/>
             </a:xfrm>
-            <a:prstGeom prst="rect">
+            <a:prstGeom prst="ellipse">
+              <a:avLst/>
+            </a:prstGeom>
+            <a:noFill/>
+            <a:ln w="31750">
+              <a:gradFill>
+                <a:gsLst>
+                  <a:gs pos="0">
+                    <a:schemeClr val="tx2">
+                      <a:lumMod val="60000"/>
+                      <a:lumOff val="40000"/>
+                      <a:alpha val="10000"/>
+                    </a:schemeClr>
+                  </a:gs>
+                  <a:gs pos="100000">
+                    <a:schemeClr val="tx2">
+                      <a:lumMod val="50000"/>
+                      <a:alpha val="20000"/>
+                    </a:schemeClr>
+                  </a:gs>
+                </a:gsLst>
+                <a:lin ang="5400000" scaled="1"/>
+              </a:gradFill>
+              <a:prstDash val="sysDot"/>
+            </a:ln>
+          </p:spPr>
+          <p:style>
+            <a:lnRef idx="2">
+              <a:schemeClr val="accent1">
+                <a:shade val="50000"/>
+              </a:schemeClr>
+            </a:lnRef>
+            <a:fillRef idx="1">
+              <a:schemeClr val="accent1"/>
+            </a:fillRef>
+            <a:effectRef idx="0">
+              <a:schemeClr val="accent1"/>
+            </a:effectRef>
+            <a:fontRef idx="minor">
+              <a:schemeClr val="lt1"/>
+            </a:fontRef>
+          </p:style>
+          <p:txBody>
+            <a:bodyPr rtlCol="0" anchor="ctr"/>
+            <a:lstStyle/>
+            <a:p>
+              <a:pPr algn="ctr"/>
+              <a:endParaRPr lang="en-US"/>
+            </a:p>
+          </p:txBody>
+        </p:sp>
+        <p:sp>
+          <p:nvSpPr>
+            <p:cNvPr id="29" name="Oval 28">
+              <a:extLst>
+                <a:ext uri="{FF2B5EF4-FFF2-40B4-BE49-F238E27FC236}">
+                  <a16:creationId xmlns:a16="http://schemas.microsoft.com/office/drawing/2014/main" id="{B26FA385-76DA-40E9-9257-AA3E07FF610B}"/>
+                </a:ext>
+                <a:ext uri="{C183D7F6-B498-43B3-948B-1728B52AA6E4}">
+                  <adec:decorative xmlns:adec="http://schemas.microsoft.com/office/drawing/2017/decorative" val="1"/>
+                </a:ext>
+              </a:extLst>
+            </p:cNvPr>
+            <p:cNvSpPr/>
+            <p:nvPr>
+              <p:extLst>
+                <p:ext uri="{386F3935-93C4-4BCD-93E2-E3B085C9AB24}">
+                  <p16:designElem xmlns:p16="http://schemas.microsoft.com/office/powerpoint/2015/main" val="1"/>
+                </p:ext>
+              </p:extLst>
+            </p:nvPr>
+          </p:nvSpPr>
+          <p:spPr>
+            <a:xfrm rot="16200000">
+              <a:off x="10435065" y="4048931"/>
+              <a:ext cx="1381607" cy="1381607"/>
+            </a:xfrm>
+            <a:prstGeom prst="ellipse">
+              <a:avLst/>
+            </a:prstGeom>
+            <a:noFill/>
+            <a:ln w="31750">
+              <a:gradFill>
+                <a:gsLst>
+                  <a:gs pos="0">
+                    <a:schemeClr val="tx2">
+                      <a:lumMod val="60000"/>
+                      <a:lumOff val="40000"/>
+                      <a:alpha val="20000"/>
+                    </a:schemeClr>
+                  </a:gs>
+                  <a:gs pos="100000">
+                    <a:schemeClr val="tx2">
+                      <a:lumMod val="50000"/>
+                      <a:alpha val="20000"/>
+                    </a:schemeClr>
+                  </a:gs>
+                </a:gsLst>
+                <a:lin ang="5400000" scaled="1"/>
+              </a:gradFill>
+              <a:prstDash val="sysDot"/>
+            </a:ln>
+          </p:spPr>
+          <p:style>
+            <a:lnRef idx="2">
+              <a:schemeClr val="accent1">
+                <a:shade val="50000"/>
+              </a:schemeClr>
+            </a:lnRef>
+            <a:fillRef idx="1">
+              <a:schemeClr val="accent1"/>
+            </a:fillRef>
+            <a:effectRef idx="0">
+              <a:schemeClr val="accent1"/>
+            </a:effectRef>
+            <a:fontRef idx="minor">
+              <a:schemeClr val="lt1"/>
+            </a:fontRef>
+          </p:style>
+          <p:txBody>
+            <a:bodyPr rtlCol="0" anchor="ctr"/>
+            <a:lstStyle/>
+            <a:p>
+              <a:pPr algn="ctr"/>
+              <a:endParaRPr lang="en-US"/>
+            </a:p>
+          </p:txBody>
+        </p:sp>
+        <p:sp>
+          <p:nvSpPr>
+            <p:cNvPr id="30" name="Oval 29">
+              <a:extLst>
+                <a:ext uri="{FF2B5EF4-FFF2-40B4-BE49-F238E27FC236}">
+                  <a16:creationId xmlns:a16="http://schemas.microsoft.com/office/drawing/2014/main" id="{262D75CA-F374-4878-8106-3EA5E970D633}"/>
+                </a:ext>
+                <a:ext uri="{C183D7F6-B498-43B3-948B-1728B52AA6E4}">
+                  <adec:decorative xmlns:adec="http://schemas.microsoft.com/office/drawing/2017/decorative" val="1"/>
+                </a:ext>
+              </a:extLst>
+            </p:cNvPr>
+            <p:cNvSpPr/>
+            <p:nvPr>
+              <p:extLst>
+                <p:ext uri="{386F3935-93C4-4BCD-93E2-E3B085C9AB24}">
+                  <p16:designElem xmlns:p16="http://schemas.microsoft.com/office/powerpoint/2015/main" val="1"/>
+                </p:ext>
+              </p:extLst>
+            </p:nvPr>
+          </p:nvSpPr>
+          <p:spPr>
+            <a:xfrm rot="16200000">
+              <a:off x="1" y="2075420"/>
+              <a:ext cx="3144364" cy="3144364"/>
+            </a:xfrm>
+            <a:prstGeom prst="ellipse">
               <a:avLst/>
             </a:prstGeom>
             <a:gradFill>
               <a:gsLst>
-                <a:gs pos="7000">
-                  <a:schemeClr val="accent2"/>
+                <a:gs pos="0">
+                  <a:schemeClr val="tx2">
+                    <a:lumMod val="75000"/>
+                    <a:alpha val="20000"/>
+                  </a:schemeClr>
                 </a:gs>
                 <a:gs pos="100000">
-                  <a:schemeClr val="accent5"/>
+                  <a:schemeClr val="tx2">
+                    <a:lumMod val="50000"/>
+                    <a:alpha val="10000"/>
+                  </a:schemeClr>
                 </a:gs>
               </a:gsLst>
-              <a:lin ang="4200000" scaled="0"/>
+              <a:lin ang="5400000" scaled="1"/>
             </a:gradFill>
             <a:ln>
               <a:noFill/>
@@ -9096,10 +9384,10 @@
         </p:sp>
         <p:sp>
           <p:nvSpPr>
-            <p:cNvPr id="16" name="Rectangle 15">
+            <p:cNvPr id="31" name="Oval 30">
               <a:extLst>
                 <a:ext uri="{FF2B5EF4-FFF2-40B4-BE49-F238E27FC236}">
-                  <a16:creationId xmlns:a16="http://schemas.microsoft.com/office/drawing/2014/main" id="{5411AD96-CCBD-9812-0D19-0E7C7A79E8D8}"/>
+                  <a16:creationId xmlns:a16="http://schemas.microsoft.com/office/drawing/2014/main" id="{938667A5-74E3-4EFD-8C45-F48F47427C7D}"/>
                 </a:ext>
                 <a:ext uri="{C183D7F6-B498-43B3-948B-1728B52AA6E4}">
                   <adec:decorative xmlns:adec="http://schemas.microsoft.com/office/drawing/2017/decorative" val="1"/>
@@ -9116,39 +9404,33 @@
             </p:nvPr>
           </p:nvSpPr>
           <p:spPr>
-            <a:xfrm rot="10800000">
-              <a:off x="6351336" y="876304"/>
-              <a:ext cx="5840664" cy="5981696"/>
+            <a:xfrm rot="12600000">
+              <a:off x="10150845" y="4270841"/>
+              <a:ext cx="1897885" cy="1897885"/>
             </a:xfrm>
-            <a:prstGeom prst="rect">
+            <a:prstGeom prst="ellipse">
               <a:avLst/>
             </a:prstGeom>
-            <a:gradFill flip="none" rotWithShape="1">
+            <a:gradFill>
               <a:gsLst>
                 <a:gs pos="0">
-                  <a:schemeClr val="accent5">
+                  <a:schemeClr val="tx2">
                     <a:lumMod val="75000"/>
+                    <a:alpha val="10000"/>
                   </a:schemeClr>
                 </a:gs>
-                <a:gs pos="60000">
-                  <a:schemeClr val="accent5">
-                    <a:lumMod val="60000"/>
-                    <a:lumOff val="40000"/>
-                    <a:alpha val="0"/>
+                <a:gs pos="100000">
+                  <a:schemeClr val="tx2">
+                    <a:lumMod val="75000"/>
+                    <a:alpha val="20000"/>
                   </a:schemeClr>
                 </a:gs>
               </a:gsLst>
-              <a:path path="circle">
-                <a:fillToRect r="100000" b="100000"/>
-              </a:path>
-              <a:tileRect l="-100000" t="-100000"/>
+              <a:lin ang="5400000" scaled="1"/>
             </a:gradFill>
-            <a:ln w="12700" cap="flat" cmpd="sng" algn="ctr">
+            <a:ln>
               <a:noFill/>
-              <a:prstDash val="solid"/>
-              <a:miter lim="800000"/>
             </a:ln>
-            <a:effectLst/>
           </p:spPr>
           <p:style>
             <a:lnRef idx="2">
@@ -9170,17 +9452,17 @@
             <a:bodyPr rtlCol="0" anchor="ctr"/>
             <a:lstStyle/>
             <a:p>
-              <a:pPr algn="r"/>
-              <a:endParaRPr lang="en-US"/>
+              <a:pPr algn="ctr"/>
+              <a:endParaRPr lang="en-US" dirty="0"/>
             </a:p>
           </p:txBody>
         </p:sp>
         <p:sp>
           <p:nvSpPr>
-            <p:cNvPr id="12" name="Rectangle 11">
+            <p:cNvPr id="32" name="Oval 31">
               <a:extLst>
                 <a:ext uri="{FF2B5EF4-FFF2-40B4-BE49-F238E27FC236}">
-                  <a16:creationId xmlns:a16="http://schemas.microsoft.com/office/drawing/2014/main" id="{5AF89D92-20DD-C8E9-DF7A-988B0964245E}"/>
+                  <a16:creationId xmlns:a16="http://schemas.microsoft.com/office/drawing/2014/main" id="{31512EE2-F4CC-4E18-9CDA-B92C11122480}"/>
                 </a:ext>
                 <a:ext uri="{C183D7F6-B498-43B3-948B-1728B52AA6E4}">
                   <adec:decorative xmlns:adec="http://schemas.microsoft.com/office/drawing/2017/decorative" val="1"/>
@@ -9197,31 +9479,34 @@
             </p:nvPr>
           </p:nvSpPr>
           <p:spPr>
-            <a:xfrm>
-              <a:off x="5171844" y="-11586"/>
-              <a:ext cx="5171848" cy="6869586"/>
+            <a:xfrm rot="4500000">
+              <a:off x="2046780" y="3040492"/>
+              <a:ext cx="2579322" cy="2579322"/>
             </a:xfrm>
-            <a:prstGeom prst="rect">
+            <a:prstGeom prst="ellipse">
               <a:avLst/>
             </a:prstGeom>
-            <a:gradFill flip="none" rotWithShape="1">
-              <a:gsLst>
-                <a:gs pos="3000">
-                  <a:schemeClr val="accent2">
-                    <a:alpha val="70000"/>
-                  </a:schemeClr>
-                </a:gs>
-                <a:gs pos="42000">
-                  <a:schemeClr val="accent2">
-                    <a:alpha val="0"/>
-                  </a:schemeClr>
-                </a:gs>
-              </a:gsLst>
-              <a:lin ang="3000000" scaled="0"/>
-              <a:tileRect/>
-            </a:gradFill>
-            <a:ln>
-              <a:noFill/>
+            <a:noFill/>
+            <a:ln w="31750">
+              <a:gradFill>
+                <a:gsLst>
+                  <a:gs pos="0">
+                    <a:schemeClr val="tx2">
+                      <a:lumMod val="60000"/>
+                      <a:lumOff val="40000"/>
+                      <a:alpha val="20000"/>
+                    </a:schemeClr>
+                  </a:gs>
+                  <a:gs pos="100000">
+                    <a:schemeClr val="tx2">
+                      <a:lumMod val="50000"/>
+                      <a:alpha val="20000"/>
+                    </a:schemeClr>
+                  </a:gs>
+                </a:gsLst>
+                <a:lin ang="5400000" scaled="1"/>
+              </a:gradFill>
+              <a:prstDash val="sysDot"/>
             </a:ln>
           </p:spPr>
           <p:style>
@@ -9251,10 +9536,10 @@
         </p:sp>
         <p:sp>
           <p:nvSpPr>
-            <p:cNvPr id="17" name="Rectangle 16">
+            <p:cNvPr id="33" name="Oval 32">
               <a:extLst>
                 <a:ext uri="{FF2B5EF4-FFF2-40B4-BE49-F238E27FC236}">
-                  <a16:creationId xmlns:a16="http://schemas.microsoft.com/office/drawing/2014/main" id="{77F78F10-63E0-611E-AC78-66E24EA306BA}"/>
+                  <a16:creationId xmlns:a16="http://schemas.microsoft.com/office/drawing/2014/main" id="{B99E503B-9B4D-4EE3-A50F-15AC374F6111}"/>
                 </a:ext>
                 <a:ext uri="{C183D7F6-B498-43B3-948B-1728B52AA6E4}">
                   <adec:decorative xmlns:adec="http://schemas.microsoft.com/office/drawing/2017/decorative" val="1"/>
@@ -9271,30 +9556,33 @@
             </p:nvPr>
           </p:nvSpPr>
           <p:spPr>
-            <a:xfrm rot="16200000">
-              <a:off x="6042356" y="708353"/>
-              <a:ext cx="6869583" cy="5429710"/>
+            <a:xfrm rot="4500000">
+              <a:off x="2224640" y="3193975"/>
+              <a:ext cx="2243193" cy="2243193"/>
             </a:xfrm>
-            <a:prstGeom prst="rect">
+            <a:prstGeom prst="ellipse">
               <a:avLst/>
             </a:prstGeom>
-            <a:gradFill>
-              <a:gsLst>
-                <a:gs pos="0">
-                  <a:schemeClr val="accent5">
-                    <a:alpha val="86000"/>
-                  </a:schemeClr>
-                </a:gs>
-                <a:gs pos="57000">
-                  <a:schemeClr val="accent2">
-                    <a:alpha val="0"/>
-                  </a:schemeClr>
-                </a:gs>
-              </a:gsLst>
-              <a:lin ang="13800000" scaled="0"/>
-            </a:gradFill>
-            <a:ln>
-              <a:noFill/>
+            <a:noFill/>
+            <a:ln w="31750">
+              <a:gradFill>
+                <a:gsLst>
+                  <a:gs pos="0">
+                    <a:schemeClr val="tx2">
+                      <a:lumMod val="60000"/>
+                      <a:lumOff val="40000"/>
+                      <a:alpha val="10000"/>
+                    </a:schemeClr>
+                  </a:gs>
+                  <a:gs pos="100000">
+                    <a:schemeClr val="tx2">
+                      <a:lumMod val="50000"/>
+                      <a:alpha val="10000"/>
+                    </a:schemeClr>
+                  </a:gs>
+                </a:gsLst>
+                <a:lin ang="5400000" scaled="1"/>
+              </a:gradFill>
             </a:ln>
           </p:spPr>
           <p:style>
@@ -9325,6 +9613,818 @@
       </p:grpSp>
       <p:sp>
         <p:nvSpPr>
+          <p:cNvPr id="35" name="Rectangle 34">
+            <a:extLst>
+              <a:ext uri="{FF2B5EF4-FFF2-40B4-BE49-F238E27FC236}">
+                <a16:creationId xmlns:a16="http://schemas.microsoft.com/office/drawing/2014/main" id="{E2683E3F-F855-4549-84F8-42064EC0F247}"/>
+              </a:ext>
+              <a:ext uri="{C183D7F6-B498-43B3-948B-1728B52AA6E4}">
+                <adec:decorative xmlns:adec="http://schemas.microsoft.com/office/drawing/2017/decorative" val="1"/>
+              </a:ext>
+            </a:extLst>
+          </p:cNvPr>
+          <p:cNvSpPr>
+            <a:spLocks noGrp="1" noRot="1" noChangeAspect="1" noMove="1" noResize="1" noEditPoints="1" noAdjustHandles="1" noChangeArrowheads="1" noChangeShapeType="1" noTextEdit="1"/>
+          </p:cNvSpPr>
+          <p:nvPr>
+            <p:extLst>
+              <p:ext uri="{386F3935-93C4-4BCD-93E2-E3B085C9AB24}">
+                <p16:designElem xmlns:p16="http://schemas.microsoft.com/office/powerpoint/2015/main" val="1"/>
+              </p:ext>
+            </p:extLst>
+          </p:nvPr>
+        </p:nvSpPr>
+        <p:spPr>
+          <a:xfrm rot="16200000">
+            <a:off x="7479052" y="1131512"/>
+            <a:ext cx="2796461" cy="533439"/>
+          </a:xfrm>
+          <a:prstGeom prst="rect">
+            <a:avLst/>
+          </a:prstGeom>
+          <a:gradFill flip="none" rotWithShape="1">
+            <a:gsLst>
+              <a:gs pos="0">
+                <a:schemeClr val="tx2">
+                  <a:lumMod val="40000"/>
+                  <a:lumOff val="60000"/>
+                  <a:alpha val="0"/>
+                </a:schemeClr>
+              </a:gs>
+              <a:gs pos="100000">
+                <a:schemeClr val="tx2">
+                  <a:lumMod val="75000"/>
+                  <a:alpha val="10000"/>
+                </a:schemeClr>
+              </a:gs>
+            </a:gsLst>
+            <a:lin ang="8400000" scaled="0"/>
+            <a:tileRect/>
+          </a:gradFill>
+          <a:ln>
+            <a:noFill/>
+          </a:ln>
+        </p:spPr>
+        <p:style>
+          <a:lnRef idx="2">
+            <a:schemeClr val="accent1">
+              <a:shade val="50000"/>
+            </a:schemeClr>
+          </a:lnRef>
+          <a:fillRef idx="1">
+            <a:schemeClr val="accent1"/>
+          </a:fillRef>
+          <a:effectRef idx="0">
+            <a:schemeClr val="accent1"/>
+          </a:effectRef>
+          <a:fontRef idx="minor">
+            <a:schemeClr val="lt1"/>
+          </a:fontRef>
+        </p:style>
+        <p:txBody>
+          <a:bodyPr rtlCol="0" anchor="ctr"/>
+          <a:lstStyle/>
+          <a:p>
+            <a:pPr algn="ctr"/>
+            <a:endParaRPr lang="en-US"/>
+          </a:p>
+        </p:txBody>
+      </p:sp>
+      <p:grpSp>
+        <p:nvGrpSpPr>
+          <p:cNvPr id="37" name="Group 36">
+            <a:extLst>
+              <a:ext uri="{FF2B5EF4-FFF2-40B4-BE49-F238E27FC236}">
+                <a16:creationId xmlns:a16="http://schemas.microsoft.com/office/drawing/2014/main" id="{8FC90B1E-0223-4440-AF22-8F32F6F0C7D2}"/>
+              </a:ext>
+              <a:ext uri="{C183D7F6-B498-43B3-948B-1728B52AA6E4}">
+                <adec:decorative xmlns:adec="http://schemas.microsoft.com/office/drawing/2017/decorative" val="1"/>
+              </a:ext>
+            </a:extLst>
+          </p:cNvPr>
+          <p:cNvGrpSpPr>
+            <a:grpSpLocks noGrp="1" noUngrp="1" noRot="1" noChangeAspect="1" noMove="1" noResize="1"/>
+          </p:cNvGrpSpPr>
+          <p:nvPr>
+            <p:extLst>
+              <p:ext uri="{386F3935-93C4-4BCD-93E2-E3B085C9AB24}">
+                <p16:designElem xmlns:p16="http://schemas.microsoft.com/office/powerpoint/2015/main" val="1"/>
+              </p:ext>
+            </p:extLst>
+          </p:nvPr>
+        </p:nvGrpSpPr>
+        <p:grpSpPr>
+          <a:xfrm>
+            <a:off x="8444654" y="317578"/>
+            <a:ext cx="411480" cy="549007"/>
+            <a:chOff x="7029447" y="3514725"/>
+            <a:chExt cx="1285875" cy="549007"/>
+          </a:xfrm>
+        </p:grpSpPr>
+        <p:cxnSp>
+          <p:nvCxnSpPr>
+            <p:cNvPr id="38" name="Straight Connector 37">
+              <a:extLst>
+                <a:ext uri="{FF2B5EF4-FFF2-40B4-BE49-F238E27FC236}">
+                  <a16:creationId xmlns:a16="http://schemas.microsoft.com/office/drawing/2014/main" id="{A2D2E879-0004-4D84-8137-1C09334038A1}"/>
+                </a:ext>
+                <a:ext uri="{C183D7F6-B498-43B3-948B-1728B52AA6E4}">
+                  <adec:decorative xmlns:adec="http://schemas.microsoft.com/office/drawing/2017/decorative" val="1"/>
+                </a:ext>
+              </a:extLst>
+            </p:cNvPr>
+            <p:cNvCxnSpPr>
+              <a:cxnSpLocks/>
+            </p:cNvCxnSpPr>
+            <p:nvPr>
+              <p:extLst>
+                <p:ext uri="{386F3935-93C4-4BCD-93E2-E3B085C9AB24}">
+                  <p16:designElem xmlns:p16="http://schemas.microsoft.com/office/powerpoint/2015/main" val="1"/>
+                </p:ext>
+              </p:extLst>
+            </p:nvPr>
+          </p:nvCxnSpPr>
+          <p:spPr>
+            <a:xfrm>
+              <a:off x="7029447" y="3514725"/>
+              <a:ext cx="1285875" cy="0"/>
+            </a:xfrm>
+            <a:prstGeom prst="line">
+              <a:avLst/>
+            </a:prstGeom>
+            <a:ln w="31750" cap="rnd" cmpd="sng">
+              <a:gradFill>
+                <a:gsLst>
+                  <a:gs pos="0">
+                    <a:schemeClr val="tx2">
+                      <a:lumMod val="60000"/>
+                      <a:lumOff val="40000"/>
+                      <a:alpha val="40000"/>
+                    </a:schemeClr>
+                  </a:gs>
+                  <a:gs pos="100000">
+                    <a:schemeClr val="tx2">
+                      <a:lumMod val="75000"/>
+                      <a:alpha val="40000"/>
+                    </a:schemeClr>
+                  </a:gs>
+                </a:gsLst>
+                <a:lin ang="5400000" scaled="1"/>
+              </a:gradFill>
+              <a:prstDash val="sysDot"/>
+              <a:round/>
+            </a:ln>
+          </p:spPr>
+          <p:style>
+            <a:lnRef idx="1">
+              <a:schemeClr val="accent1"/>
+            </a:lnRef>
+            <a:fillRef idx="0">
+              <a:schemeClr val="accent1"/>
+            </a:fillRef>
+            <a:effectRef idx="0">
+              <a:schemeClr val="accent1"/>
+            </a:effectRef>
+            <a:fontRef idx="minor">
+              <a:schemeClr val="tx1"/>
+            </a:fontRef>
+          </p:style>
+        </p:cxnSp>
+        <p:cxnSp>
+          <p:nvCxnSpPr>
+            <p:cNvPr id="39" name="Straight Connector 38">
+              <a:extLst>
+                <a:ext uri="{FF2B5EF4-FFF2-40B4-BE49-F238E27FC236}">
+                  <a16:creationId xmlns:a16="http://schemas.microsoft.com/office/drawing/2014/main" id="{43BE75A2-0D83-4F8E-84CC-D3BCD565B1B1}"/>
+                </a:ext>
+                <a:ext uri="{C183D7F6-B498-43B3-948B-1728B52AA6E4}">
+                  <adec:decorative xmlns:adec="http://schemas.microsoft.com/office/drawing/2017/decorative" val="1"/>
+                </a:ext>
+              </a:extLst>
+            </p:cNvPr>
+            <p:cNvCxnSpPr>
+              <a:cxnSpLocks/>
+            </p:cNvCxnSpPr>
+            <p:nvPr>
+              <p:extLst>
+                <p:ext uri="{386F3935-93C4-4BCD-93E2-E3B085C9AB24}">
+                  <p16:designElem xmlns:p16="http://schemas.microsoft.com/office/powerpoint/2015/main" val="1"/>
+                </p:ext>
+              </p:extLst>
+            </p:nvPr>
+          </p:nvCxnSpPr>
+          <p:spPr>
+            <a:xfrm>
+              <a:off x="7029447" y="3697727"/>
+              <a:ext cx="1285875" cy="0"/>
+            </a:xfrm>
+            <a:prstGeom prst="line">
+              <a:avLst/>
+            </a:prstGeom>
+            <a:ln w="31750" cap="rnd" cmpd="sng">
+              <a:gradFill>
+                <a:gsLst>
+                  <a:gs pos="0">
+                    <a:schemeClr val="tx2">
+                      <a:lumMod val="60000"/>
+                      <a:lumOff val="40000"/>
+                      <a:alpha val="40000"/>
+                    </a:schemeClr>
+                  </a:gs>
+                  <a:gs pos="100000">
+                    <a:schemeClr val="tx2">
+                      <a:lumMod val="75000"/>
+                      <a:alpha val="40000"/>
+                    </a:schemeClr>
+                  </a:gs>
+                </a:gsLst>
+                <a:lin ang="5400000" scaled="1"/>
+              </a:gradFill>
+              <a:prstDash val="sysDot"/>
+              <a:round/>
+            </a:ln>
+          </p:spPr>
+          <p:style>
+            <a:lnRef idx="1">
+              <a:schemeClr val="accent1"/>
+            </a:lnRef>
+            <a:fillRef idx="0">
+              <a:schemeClr val="accent1"/>
+            </a:fillRef>
+            <a:effectRef idx="0">
+              <a:schemeClr val="accent1"/>
+            </a:effectRef>
+            <a:fontRef idx="minor">
+              <a:schemeClr val="tx1"/>
+            </a:fontRef>
+          </p:style>
+        </p:cxnSp>
+        <p:cxnSp>
+          <p:nvCxnSpPr>
+            <p:cNvPr id="40" name="Straight Connector 39">
+              <a:extLst>
+                <a:ext uri="{FF2B5EF4-FFF2-40B4-BE49-F238E27FC236}">
+                  <a16:creationId xmlns:a16="http://schemas.microsoft.com/office/drawing/2014/main" id="{E90F7F49-1039-49EF-A9BD-153DB590B68A}"/>
+                </a:ext>
+                <a:ext uri="{C183D7F6-B498-43B3-948B-1728B52AA6E4}">
+                  <adec:decorative xmlns:adec="http://schemas.microsoft.com/office/drawing/2017/decorative" val="1"/>
+                </a:ext>
+              </a:extLst>
+            </p:cNvPr>
+            <p:cNvCxnSpPr>
+              <a:cxnSpLocks/>
+            </p:cNvCxnSpPr>
+            <p:nvPr>
+              <p:extLst>
+                <p:ext uri="{386F3935-93C4-4BCD-93E2-E3B085C9AB24}">
+                  <p16:designElem xmlns:p16="http://schemas.microsoft.com/office/powerpoint/2015/main" val="1"/>
+                </p:ext>
+              </p:extLst>
+            </p:nvPr>
+          </p:nvCxnSpPr>
+          <p:spPr>
+            <a:xfrm>
+              <a:off x="7029447" y="3880729"/>
+              <a:ext cx="1285875" cy="0"/>
+            </a:xfrm>
+            <a:prstGeom prst="line">
+              <a:avLst/>
+            </a:prstGeom>
+            <a:ln w="31750" cap="rnd" cmpd="sng">
+              <a:gradFill>
+                <a:gsLst>
+                  <a:gs pos="0">
+                    <a:schemeClr val="tx2">
+                      <a:lumMod val="60000"/>
+                      <a:lumOff val="40000"/>
+                      <a:alpha val="40000"/>
+                    </a:schemeClr>
+                  </a:gs>
+                  <a:gs pos="100000">
+                    <a:schemeClr val="tx2">
+                      <a:lumMod val="75000"/>
+                      <a:alpha val="40000"/>
+                    </a:schemeClr>
+                  </a:gs>
+                </a:gsLst>
+                <a:lin ang="5400000" scaled="1"/>
+              </a:gradFill>
+              <a:prstDash val="sysDot"/>
+              <a:round/>
+            </a:ln>
+          </p:spPr>
+          <p:style>
+            <a:lnRef idx="1">
+              <a:schemeClr val="accent1"/>
+            </a:lnRef>
+            <a:fillRef idx="0">
+              <a:schemeClr val="accent1"/>
+            </a:fillRef>
+            <a:effectRef idx="0">
+              <a:schemeClr val="accent1"/>
+            </a:effectRef>
+            <a:fontRef idx="minor">
+              <a:schemeClr val="tx1"/>
+            </a:fontRef>
+          </p:style>
+        </p:cxnSp>
+        <p:cxnSp>
+          <p:nvCxnSpPr>
+            <p:cNvPr id="41" name="Straight Connector 40">
+              <a:extLst>
+                <a:ext uri="{FF2B5EF4-FFF2-40B4-BE49-F238E27FC236}">
+                  <a16:creationId xmlns:a16="http://schemas.microsoft.com/office/drawing/2014/main" id="{9E85F508-9EA4-4B4D-8171-648670650E9A}"/>
+                </a:ext>
+                <a:ext uri="{C183D7F6-B498-43B3-948B-1728B52AA6E4}">
+                  <adec:decorative xmlns:adec="http://schemas.microsoft.com/office/drawing/2017/decorative" val="1"/>
+                </a:ext>
+              </a:extLst>
+            </p:cNvPr>
+            <p:cNvCxnSpPr>
+              <a:cxnSpLocks/>
+            </p:cNvCxnSpPr>
+            <p:nvPr>
+              <p:extLst>
+                <p:ext uri="{386F3935-93C4-4BCD-93E2-E3B085C9AB24}">
+                  <p16:designElem xmlns:p16="http://schemas.microsoft.com/office/powerpoint/2015/main" val="1"/>
+                </p:ext>
+              </p:extLst>
+            </p:nvPr>
+          </p:nvCxnSpPr>
+          <p:spPr>
+            <a:xfrm>
+              <a:off x="7029447" y="4063732"/>
+              <a:ext cx="1285875" cy="0"/>
+            </a:xfrm>
+            <a:prstGeom prst="line">
+              <a:avLst/>
+            </a:prstGeom>
+            <a:ln w="31750" cap="rnd" cmpd="sng">
+              <a:gradFill>
+                <a:gsLst>
+                  <a:gs pos="0">
+                    <a:schemeClr val="tx2">
+                      <a:lumMod val="60000"/>
+                      <a:lumOff val="40000"/>
+                      <a:alpha val="40000"/>
+                    </a:schemeClr>
+                  </a:gs>
+                  <a:gs pos="100000">
+                    <a:schemeClr val="tx2">
+                      <a:lumMod val="75000"/>
+                      <a:alpha val="40000"/>
+                    </a:schemeClr>
+                  </a:gs>
+                </a:gsLst>
+                <a:lin ang="5400000" scaled="1"/>
+              </a:gradFill>
+              <a:prstDash val="sysDot"/>
+              <a:round/>
+            </a:ln>
+          </p:spPr>
+          <p:style>
+            <a:lnRef idx="1">
+              <a:schemeClr val="accent1"/>
+            </a:lnRef>
+            <a:fillRef idx="0">
+              <a:schemeClr val="accent1"/>
+            </a:fillRef>
+            <a:effectRef idx="0">
+              <a:schemeClr val="accent1"/>
+            </a:effectRef>
+            <a:fontRef idx="minor">
+              <a:schemeClr val="tx1"/>
+            </a:fontRef>
+          </p:style>
+        </p:cxnSp>
+      </p:grpSp>
+      <p:sp>
+        <p:nvSpPr>
+          <p:cNvPr id="43" name="Rectangle 42">
+            <a:extLst>
+              <a:ext uri="{FF2B5EF4-FFF2-40B4-BE49-F238E27FC236}">
+                <a16:creationId xmlns:a16="http://schemas.microsoft.com/office/drawing/2014/main" id="{832F3179-0CD5-40C8-9939-D8355006F7BA}"/>
+              </a:ext>
+              <a:ext uri="{C183D7F6-B498-43B3-948B-1728B52AA6E4}">
+                <adec:decorative xmlns:adec="http://schemas.microsoft.com/office/drawing/2017/decorative" val="1"/>
+              </a:ext>
+            </a:extLst>
+          </p:cNvPr>
+          <p:cNvSpPr>
+            <a:spLocks noGrp="1" noRot="1" noChangeAspect="1" noMove="1" noResize="1" noEditPoints="1" noAdjustHandles="1" noChangeArrowheads="1" noChangeShapeType="1" noTextEdit="1"/>
+          </p:cNvSpPr>
+          <p:nvPr>
+            <p:extLst>
+              <p:ext uri="{386F3935-93C4-4BCD-93E2-E3B085C9AB24}">
+                <p16:designElem xmlns:p16="http://schemas.microsoft.com/office/powerpoint/2015/main" val="1"/>
+              </p:ext>
+            </p:extLst>
+          </p:nvPr>
+        </p:nvSpPr>
+        <p:spPr>
+          <a:xfrm rot="10800000">
+            <a:off x="0" y="6140785"/>
+            <a:ext cx="4571997" cy="711252"/>
+          </a:xfrm>
+          <a:prstGeom prst="rect">
+            <a:avLst/>
+          </a:prstGeom>
+          <a:gradFill flip="none" rotWithShape="1">
+            <a:gsLst>
+              <a:gs pos="10000">
+                <a:schemeClr val="tx2">
+                  <a:lumMod val="50000"/>
+                  <a:alpha val="10000"/>
+                </a:schemeClr>
+              </a:gs>
+              <a:gs pos="100000">
+                <a:schemeClr val="tx2">
+                  <a:lumMod val="60000"/>
+                  <a:lumOff val="40000"/>
+                  <a:alpha val="0"/>
+                </a:schemeClr>
+              </a:gs>
+            </a:gsLst>
+            <a:lin ang="8400000" scaled="0"/>
+            <a:tileRect/>
+          </a:gradFill>
+          <a:ln>
+            <a:noFill/>
+          </a:ln>
+        </p:spPr>
+        <p:style>
+          <a:lnRef idx="2">
+            <a:schemeClr val="accent1">
+              <a:shade val="50000"/>
+            </a:schemeClr>
+          </a:lnRef>
+          <a:fillRef idx="1">
+            <a:schemeClr val="accent1"/>
+          </a:fillRef>
+          <a:effectRef idx="0">
+            <a:schemeClr val="accent1"/>
+          </a:effectRef>
+          <a:fontRef idx="minor">
+            <a:schemeClr val="lt1"/>
+          </a:fontRef>
+        </p:style>
+        <p:txBody>
+          <a:bodyPr rtlCol="0" anchor="ctr"/>
+          <a:lstStyle/>
+          <a:p>
+            <a:pPr algn="ctr"/>
+            <a:endParaRPr lang="en-US"/>
+          </a:p>
+        </p:txBody>
+      </p:sp>
+      <p:grpSp>
+        <p:nvGrpSpPr>
+          <p:cNvPr id="45" name="Group 44">
+            <a:extLst>
+              <a:ext uri="{FF2B5EF4-FFF2-40B4-BE49-F238E27FC236}">
+                <a16:creationId xmlns:a16="http://schemas.microsoft.com/office/drawing/2014/main" id="{11CE155D-684B-4F5E-B835-C52765E310E7}"/>
+              </a:ext>
+              <a:ext uri="{C183D7F6-B498-43B3-948B-1728B52AA6E4}">
+                <adec:decorative xmlns:adec="http://schemas.microsoft.com/office/drawing/2017/decorative" val="1"/>
+              </a:ext>
+            </a:extLst>
+          </p:cNvPr>
+          <p:cNvGrpSpPr>
+            <a:grpSpLocks noGrp="1" noUngrp="1" noRot="1" noChangeAspect="1" noMove="1" noResize="1"/>
+          </p:cNvGrpSpPr>
+          <p:nvPr>
+            <p:extLst>
+              <p:ext uri="{386F3935-93C4-4BCD-93E2-E3B085C9AB24}">
+                <p16:designElem xmlns:p16="http://schemas.microsoft.com/office/powerpoint/2015/main" val="1"/>
+              </p:ext>
+            </p:extLst>
+          </p:nvPr>
+        </p:nvGrpSpPr>
+        <p:grpSpPr>
+          <a:xfrm rot="5400000">
+            <a:off x="-645785" y="5940560"/>
+            <a:ext cx="1285875" cy="549007"/>
+            <a:chOff x="7029447" y="3514725"/>
+            <a:chExt cx="1285875" cy="549007"/>
+          </a:xfrm>
+        </p:grpSpPr>
+        <p:cxnSp>
+          <p:nvCxnSpPr>
+            <p:cNvPr id="46" name="Straight Connector 45">
+              <a:extLst>
+                <a:ext uri="{FF2B5EF4-FFF2-40B4-BE49-F238E27FC236}">
+                  <a16:creationId xmlns:a16="http://schemas.microsoft.com/office/drawing/2014/main" id="{04F84AF8-E1A7-41D4-A102-8F87CAE37EE7}"/>
+                </a:ext>
+                <a:ext uri="{C183D7F6-B498-43B3-948B-1728B52AA6E4}">
+                  <adec:decorative xmlns:adec="http://schemas.microsoft.com/office/drawing/2017/decorative" val="1"/>
+                </a:ext>
+              </a:extLst>
+            </p:cNvPr>
+            <p:cNvCxnSpPr>
+              <a:cxnSpLocks/>
+            </p:cNvCxnSpPr>
+            <p:nvPr>
+              <p:extLst>
+                <p:ext uri="{386F3935-93C4-4BCD-93E2-E3B085C9AB24}">
+                  <p16:designElem xmlns:p16="http://schemas.microsoft.com/office/powerpoint/2015/main" val="1"/>
+                </p:ext>
+              </p:extLst>
+            </p:nvPr>
+          </p:nvCxnSpPr>
+          <p:spPr>
+            <a:xfrm>
+              <a:off x="7029447" y="3514725"/>
+              <a:ext cx="1285875" cy="0"/>
+            </a:xfrm>
+            <a:prstGeom prst="line">
+              <a:avLst/>
+            </a:prstGeom>
+            <a:ln w="31750" cap="rnd" cmpd="sng">
+              <a:gradFill>
+                <a:gsLst>
+                  <a:gs pos="0">
+                    <a:schemeClr val="tx2">
+                      <a:lumMod val="60000"/>
+                      <a:lumOff val="40000"/>
+                      <a:alpha val="40000"/>
+                    </a:schemeClr>
+                  </a:gs>
+                  <a:gs pos="100000">
+                    <a:schemeClr val="tx2">
+                      <a:lumMod val="50000"/>
+                      <a:alpha val="40000"/>
+                    </a:schemeClr>
+                  </a:gs>
+                </a:gsLst>
+                <a:lin ang="5400000" scaled="1"/>
+              </a:gradFill>
+              <a:prstDash val="sysDot"/>
+              <a:round/>
+            </a:ln>
+          </p:spPr>
+          <p:style>
+            <a:lnRef idx="1">
+              <a:schemeClr val="accent1"/>
+            </a:lnRef>
+            <a:fillRef idx="0">
+              <a:schemeClr val="accent1"/>
+            </a:fillRef>
+            <a:effectRef idx="0">
+              <a:schemeClr val="accent1"/>
+            </a:effectRef>
+            <a:fontRef idx="minor">
+              <a:schemeClr val="tx1"/>
+            </a:fontRef>
+          </p:style>
+        </p:cxnSp>
+        <p:cxnSp>
+          <p:nvCxnSpPr>
+            <p:cNvPr id="47" name="Straight Connector 46">
+              <a:extLst>
+                <a:ext uri="{FF2B5EF4-FFF2-40B4-BE49-F238E27FC236}">
+                  <a16:creationId xmlns:a16="http://schemas.microsoft.com/office/drawing/2014/main" id="{4ED126F1-DB23-4314-B6C7-FE89E3C581AB}"/>
+                </a:ext>
+                <a:ext uri="{C183D7F6-B498-43B3-948B-1728B52AA6E4}">
+                  <adec:decorative xmlns:adec="http://schemas.microsoft.com/office/drawing/2017/decorative" val="1"/>
+                </a:ext>
+              </a:extLst>
+            </p:cNvPr>
+            <p:cNvCxnSpPr>
+              <a:cxnSpLocks/>
+            </p:cNvCxnSpPr>
+            <p:nvPr>
+              <p:extLst>
+                <p:ext uri="{386F3935-93C4-4BCD-93E2-E3B085C9AB24}">
+                  <p16:designElem xmlns:p16="http://schemas.microsoft.com/office/powerpoint/2015/main" val="1"/>
+                </p:ext>
+              </p:extLst>
+            </p:nvPr>
+          </p:nvCxnSpPr>
+          <p:spPr>
+            <a:xfrm>
+              <a:off x="7029447" y="3697727"/>
+              <a:ext cx="1285875" cy="0"/>
+            </a:xfrm>
+            <a:prstGeom prst="line">
+              <a:avLst/>
+            </a:prstGeom>
+            <a:ln w="31750" cap="rnd" cmpd="sng">
+              <a:gradFill>
+                <a:gsLst>
+                  <a:gs pos="0">
+                    <a:schemeClr val="tx2">
+                      <a:lumMod val="60000"/>
+                      <a:lumOff val="40000"/>
+                      <a:alpha val="40000"/>
+                    </a:schemeClr>
+                  </a:gs>
+                  <a:gs pos="100000">
+                    <a:schemeClr val="tx2">
+                      <a:lumMod val="50000"/>
+                      <a:alpha val="40000"/>
+                    </a:schemeClr>
+                  </a:gs>
+                </a:gsLst>
+                <a:lin ang="5400000" scaled="1"/>
+              </a:gradFill>
+              <a:prstDash val="sysDot"/>
+              <a:round/>
+            </a:ln>
+          </p:spPr>
+          <p:style>
+            <a:lnRef idx="1">
+              <a:schemeClr val="accent1"/>
+            </a:lnRef>
+            <a:fillRef idx="0">
+              <a:schemeClr val="accent1"/>
+            </a:fillRef>
+            <a:effectRef idx="0">
+              <a:schemeClr val="accent1"/>
+            </a:effectRef>
+            <a:fontRef idx="minor">
+              <a:schemeClr val="tx1"/>
+            </a:fontRef>
+          </p:style>
+        </p:cxnSp>
+        <p:cxnSp>
+          <p:nvCxnSpPr>
+            <p:cNvPr id="48" name="Straight Connector 47">
+              <a:extLst>
+                <a:ext uri="{FF2B5EF4-FFF2-40B4-BE49-F238E27FC236}">
+                  <a16:creationId xmlns:a16="http://schemas.microsoft.com/office/drawing/2014/main" id="{8ACB2B6F-8883-4A00-88DD-98CDDD46B8A6}"/>
+                </a:ext>
+                <a:ext uri="{C183D7F6-B498-43B3-948B-1728B52AA6E4}">
+                  <adec:decorative xmlns:adec="http://schemas.microsoft.com/office/drawing/2017/decorative" val="1"/>
+                </a:ext>
+              </a:extLst>
+            </p:cNvPr>
+            <p:cNvCxnSpPr>
+              <a:cxnSpLocks/>
+            </p:cNvCxnSpPr>
+            <p:nvPr>
+              <p:extLst>
+                <p:ext uri="{386F3935-93C4-4BCD-93E2-E3B085C9AB24}">
+                  <p16:designElem xmlns:p16="http://schemas.microsoft.com/office/powerpoint/2015/main" val="1"/>
+                </p:ext>
+              </p:extLst>
+            </p:nvPr>
+          </p:nvCxnSpPr>
+          <p:spPr>
+            <a:xfrm>
+              <a:off x="7029447" y="3880729"/>
+              <a:ext cx="1285875" cy="0"/>
+            </a:xfrm>
+            <a:prstGeom prst="line">
+              <a:avLst/>
+            </a:prstGeom>
+            <a:ln w="31750" cap="rnd" cmpd="sng">
+              <a:gradFill>
+                <a:gsLst>
+                  <a:gs pos="0">
+                    <a:schemeClr val="tx2">
+                      <a:lumMod val="60000"/>
+                      <a:lumOff val="40000"/>
+                      <a:alpha val="40000"/>
+                    </a:schemeClr>
+                  </a:gs>
+                  <a:gs pos="100000">
+                    <a:schemeClr val="tx2">
+                      <a:lumMod val="50000"/>
+                      <a:alpha val="40000"/>
+                    </a:schemeClr>
+                  </a:gs>
+                </a:gsLst>
+                <a:lin ang="5400000" scaled="1"/>
+              </a:gradFill>
+              <a:prstDash val="sysDot"/>
+              <a:round/>
+            </a:ln>
+          </p:spPr>
+          <p:style>
+            <a:lnRef idx="1">
+              <a:schemeClr val="accent1"/>
+            </a:lnRef>
+            <a:fillRef idx="0">
+              <a:schemeClr val="accent1"/>
+            </a:fillRef>
+            <a:effectRef idx="0">
+              <a:schemeClr val="accent1"/>
+            </a:effectRef>
+            <a:fontRef idx="minor">
+              <a:schemeClr val="tx1"/>
+            </a:fontRef>
+          </p:style>
+        </p:cxnSp>
+        <p:cxnSp>
+          <p:nvCxnSpPr>
+            <p:cNvPr id="49" name="Straight Connector 48">
+              <a:extLst>
+                <a:ext uri="{FF2B5EF4-FFF2-40B4-BE49-F238E27FC236}">
+                  <a16:creationId xmlns:a16="http://schemas.microsoft.com/office/drawing/2014/main" id="{3B9A2180-808A-4423-BB2B-6464B290007A}"/>
+                </a:ext>
+                <a:ext uri="{C183D7F6-B498-43B3-948B-1728B52AA6E4}">
+                  <adec:decorative xmlns:adec="http://schemas.microsoft.com/office/drawing/2017/decorative" val="1"/>
+                </a:ext>
+              </a:extLst>
+            </p:cNvPr>
+            <p:cNvCxnSpPr>
+              <a:cxnSpLocks/>
+            </p:cNvCxnSpPr>
+            <p:nvPr>
+              <p:extLst>
+                <p:ext uri="{386F3935-93C4-4BCD-93E2-E3B085C9AB24}">
+                  <p16:designElem xmlns:p16="http://schemas.microsoft.com/office/powerpoint/2015/main" val="1"/>
+                </p:ext>
+              </p:extLst>
+            </p:nvPr>
+          </p:nvCxnSpPr>
+          <p:spPr>
+            <a:xfrm>
+              <a:off x="7029447" y="4063732"/>
+              <a:ext cx="1285875" cy="0"/>
+            </a:xfrm>
+            <a:prstGeom prst="line">
+              <a:avLst/>
+            </a:prstGeom>
+            <a:ln w="31750" cap="rnd" cmpd="sng">
+              <a:gradFill>
+                <a:gsLst>
+                  <a:gs pos="0">
+                    <a:schemeClr val="tx2">
+                      <a:lumMod val="60000"/>
+                      <a:lumOff val="40000"/>
+                      <a:alpha val="40000"/>
+                    </a:schemeClr>
+                  </a:gs>
+                  <a:gs pos="100000">
+                    <a:schemeClr val="tx2">
+                      <a:lumMod val="50000"/>
+                      <a:alpha val="40000"/>
+                    </a:schemeClr>
+                  </a:gs>
+                </a:gsLst>
+                <a:lin ang="5400000" scaled="1"/>
+              </a:gradFill>
+              <a:prstDash val="sysDot"/>
+              <a:round/>
+            </a:ln>
+          </p:spPr>
+          <p:style>
+            <a:lnRef idx="1">
+              <a:schemeClr val="accent1"/>
+            </a:lnRef>
+            <a:fillRef idx="0">
+              <a:schemeClr val="accent1"/>
+            </a:fillRef>
+            <a:effectRef idx="0">
+              <a:schemeClr val="accent1"/>
+            </a:effectRef>
+            <a:fontRef idx="minor">
+              <a:schemeClr val="tx1"/>
+            </a:fontRef>
+          </p:style>
+        </p:cxnSp>
+      </p:grpSp>
+      <p:pic>
+        <p:nvPicPr>
+          <p:cNvPr id="18" name="Picture 17" descr="A close-up of a colorful cube&#10;&#10;Description automatically generated">
+            <a:extLst>
+              <a:ext uri="{FF2B5EF4-FFF2-40B4-BE49-F238E27FC236}">
+                <a16:creationId xmlns:a16="http://schemas.microsoft.com/office/drawing/2014/main" id="{266E2B81-15A5-A1B9-32C2-8D3CCED43DBF}"/>
+              </a:ext>
+            </a:extLst>
+          </p:cNvPr>
+          <p:cNvPicPr>
+            <a:picLocks noChangeAspect="1"/>
+          </p:cNvPicPr>
+          <p:nvPr/>
+        </p:nvPicPr>
+        <p:blipFill rotWithShape="1">
+          <a:blip r:embed="rId3">
+            <a:duotone>
+              <a:prstClr val="black"/>
+              <a:schemeClr val="bg1">
+                <a:tint val="45000"/>
+                <a:satMod val="400000"/>
+              </a:schemeClr>
+            </a:duotone>
+            <a:alphaModFix amt="25000"/>
+          </a:blip>
+          <a:srcRect l="18641" r="10880" b="2"/>
+          <a:stretch/>
+        </p:blipFill>
+        <p:spPr>
+          <a:xfrm>
+            <a:off x="2895500" y="29548"/>
+            <a:ext cx="3401463" cy="6013845"/>
+          </a:xfrm>
+          <a:prstGeom prst="rect">
+            <a:avLst/>
+          </a:prstGeom>
+        </p:spPr>
+      </p:pic>
+      <p:sp>
+        <p:nvSpPr>
           <p:cNvPr id="2" name="Title 1"/>
           <p:cNvSpPr>
             <a:spLocks noGrp="1"/>
@@ -9335,25 +10435,21 @@
         </p:nvSpPr>
         <p:spPr>
           <a:xfrm>
-            <a:off x="4641021" y="1536179"/>
-            <a:ext cx="3740844" cy="2135125"/>
+            <a:off x="1963629" y="630936"/>
+            <a:ext cx="5486400" cy="2702018"/>
           </a:xfrm>
+          <a:noFill/>
         </p:spPr>
         <p:txBody>
-          <a:bodyPr>
+          <a:bodyPr anchor="b">
             <a:normAutofit/>
           </a:bodyPr>
           <a:lstStyle/>
           <a:p>
-            <a:pPr>
-              <a:lnSpc>
-                <a:spcPct val="90000"/>
-              </a:lnSpc>
-            </a:pPr>
-            <a:r>
-              <a:rPr lang="en-US" sz="3000">
+            <a:r>
+              <a:rPr lang="en-US" sz="4200">
                 <a:solidFill>
-                  <a:srgbClr val="FFFFFF"/>
+                  <a:schemeClr val="bg1"/>
                 </a:solidFill>
               </a:rPr>
               <a:t>Modernizing ActiveGear: A Strategic Shift to Database Management</a:t>
@@ -9373,37 +10469,38 @@
         </p:nvSpPr>
         <p:spPr>
           <a:xfrm>
-            <a:off x="4641021" y="3930447"/>
-            <a:ext cx="3740844" cy="1263985"/>
+            <a:off x="1963630" y="3427487"/>
+            <a:ext cx="5486400" cy="2615906"/>
           </a:xfrm>
+          <a:noFill/>
         </p:spPr>
         <p:txBody>
-          <a:bodyPr>
+          <a:bodyPr anchor="t">
             <a:normAutofit/>
           </a:bodyPr>
           <a:lstStyle/>
           <a:p>
             <a:r>
-              <a:rPr lang="en-US" sz="1700">
+              <a:rPr lang="en-US">
                 <a:solidFill>
-                  <a:srgbClr val="FFFFFF"/>
+                  <a:schemeClr val="bg1"/>
                 </a:solidFill>
               </a:rPr>
               <a:t>Leveraging Data to Enhance Operational Efficiency</a:t>
             </a:r>
           </a:p>
           <a:p>
-            <a:endParaRPr lang="en-US" sz="1700">
+            <a:endParaRPr lang="en-US">
               <a:solidFill>
-                <a:srgbClr val="FFFFFF"/>
+                <a:schemeClr val="bg1"/>
               </a:solidFill>
             </a:endParaRPr>
           </a:p>
           <a:p>
             <a:r>
-              <a:rPr lang="en-US" sz="1700">
+              <a:rPr lang="en-US">
                 <a:solidFill>
-                  <a:srgbClr val="FFFFFF"/>
+                  <a:schemeClr val="bg1"/>
                 </a:solidFill>
               </a:rPr>
               <a:t>By: Ryan Talbot</a:t>
@@ -9411,35 +10508,6 @@
           </a:p>
         </p:txBody>
       </p:sp>
-      <p:pic>
-        <p:nvPicPr>
-          <p:cNvPr id="18" name="Picture 17" descr="A close-up of a colorful cube&#10;&#10;Description automatically generated">
-            <a:extLst>
-              <a:ext uri="{FF2B5EF4-FFF2-40B4-BE49-F238E27FC236}">
-                <a16:creationId xmlns:a16="http://schemas.microsoft.com/office/drawing/2014/main" id="{266E2B81-15A5-A1B9-32C2-8D3CCED43DBF}"/>
-              </a:ext>
-            </a:extLst>
-          </p:cNvPr>
-          <p:cNvPicPr>
-            <a:picLocks noChangeAspect="1"/>
-          </p:cNvPicPr>
-          <p:nvPr/>
-        </p:nvPicPr>
-        <p:blipFill rotWithShape="1">
-          <a:blip r:embed="rId3"/>
-          <a:srcRect l="18641" r="10880" b="2"/>
-          <a:stretch/>
-        </p:blipFill>
-        <p:spPr>
-          <a:xfrm>
-            <a:off x="20" y="-7622"/>
-            <a:ext cx="3878866" cy="6865622"/>
-          </a:xfrm>
-          <a:prstGeom prst="rect">
-            <a:avLst/>
-          </a:prstGeom>
-        </p:spPr>
-      </p:pic>
     </p:spTree>
   </p:cSld>
   <p:clrMapOvr>
@@ -30227,10 +31295,10 @@
       </p:grpSpPr>
       <p:sp useBgFill="1">
         <p:nvSpPr>
-          <p:cNvPr id="8" name="Rectangle 7">
+          <p:cNvPr id="38" name="Rectangle 37">
             <a:extLst>
               <a:ext uri="{FF2B5EF4-FFF2-40B4-BE49-F238E27FC236}">
-                <a16:creationId xmlns:a16="http://schemas.microsoft.com/office/drawing/2014/main" id="{1C799903-48D5-4A31-A1A2-541072D9771E}"/>
+                <a16:creationId xmlns:a16="http://schemas.microsoft.com/office/drawing/2014/main" id="{907EF6B7-1338-4443-8C46-6A318D952DFD}"/>
               </a:ext>
               <a:ext uri="{C183D7F6-B498-43B3-948B-1728B52AA6E4}">
                 <adec:decorative xmlns:adec="http://schemas.microsoft.com/office/drawing/2017/decorative" val="1"/>
@@ -30250,8 +31318,8 @@
         </p:nvSpPr>
         <p:spPr>
           <a:xfrm>
-            <a:off x="0" y="0"/>
-            <a:ext cx="9144001" cy="6858000"/>
+            <a:off x="2286" y="0"/>
+            <a:ext cx="9141714" cy="6858000"/>
           </a:xfrm>
           <a:prstGeom prst="rect">
             <a:avLst/>
@@ -30285,12 +31353,12 @@
           </a:p>
         </p:txBody>
       </p:sp>
-      <p:sp useBgFill="1">
+      <p:sp>
         <p:nvSpPr>
-          <p:cNvPr id="10" name="Freeform: Shape 9">
+          <p:cNvPr id="40" name="Freeform: Shape 39">
             <a:extLst>
               <a:ext uri="{FF2B5EF4-FFF2-40B4-BE49-F238E27FC236}">
-                <a16:creationId xmlns:a16="http://schemas.microsoft.com/office/drawing/2014/main" id="{8EFFF109-FC58-4FD3-BE05-9775A1310F55}"/>
+                <a16:creationId xmlns:a16="http://schemas.microsoft.com/office/drawing/2014/main" id="{DAAE4CDD-124C-4DCF-9584-B6033B545DD5}"/>
               </a:ext>
               <a:ext uri="{C183D7F6-B498-43B3-948B-1728B52AA6E4}">
                 <adec:decorative xmlns:adec="http://schemas.microsoft.com/office/drawing/2017/decorative" val="1"/>
@@ -30311,24 +31379,24 @@
         <p:spPr>
           <a:xfrm>
             <a:off x="0" y="0"/>
-            <a:ext cx="3614166" cy="6858000"/>
+            <a:ext cx="3125454" cy="6858000"/>
           </a:xfrm>
           <a:custGeom>
             <a:avLst/>
             <a:gdLst>
-              <a:gd name="connsiteX0" fmla="*/ 0 w 4818889"/>
+              <a:gd name="connsiteX0" fmla="*/ 0 w 4167271"/>
               <a:gd name="connsiteY0" fmla="*/ 0 h 6858000"/>
-              <a:gd name="connsiteX1" fmla="*/ 3605911 w 4818889"/>
+              <a:gd name="connsiteX1" fmla="*/ 2259550 w 4167271"/>
               <a:gd name="connsiteY1" fmla="*/ 0 h 6858000"/>
-              <a:gd name="connsiteX2" fmla="*/ 3668894 w 4818889"/>
-              <a:gd name="connsiteY2" fmla="*/ 69271 h 6858000"/>
-              <a:gd name="connsiteX3" fmla="*/ 4818889 w 4818889"/>
+              <a:gd name="connsiteX2" fmla="*/ 2387803 w 4167271"/>
+              <a:gd name="connsiteY2" fmla="*/ 82222 h 6858000"/>
+              <a:gd name="connsiteX3" fmla="*/ 4167271 w 4167271"/>
               <a:gd name="connsiteY3" fmla="*/ 3429000 h 6858000"/>
-              <a:gd name="connsiteX4" fmla="*/ 3668894 w 4818889"/>
-              <a:gd name="connsiteY4" fmla="*/ 6788730 h 6858000"/>
-              <a:gd name="connsiteX5" fmla="*/ 3605911 w 4818889"/>
+              <a:gd name="connsiteX4" fmla="*/ 2387803 w 4167271"/>
+              <a:gd name="connsiteY4" fmla="*/ 6775779 h 6858000"/>
+              <a:gd name="connsiteX5" fmla="*/ 2259550 w 4167271"/>
               <a:gd name="connsiteY5" fmla="*/ 6858000 h 6858000"/>
-              <a:gd name="connsiteX6" fmla="*/ 0 w 4818889"/>
+              <a:gd name="connsiteX6" fmla="*/ 0 w 4167271"/>
               <a:gd name="connsiteY6" fmla="*/ 6858000 h 6858000"/>
             </a:gdLst>
             <a:ahLst/>
@@ -30357,28 +31425,28 @@
             </a:cxnLst>
             <a:rect l="l" t="t" r="r" b="b"/>
             <a:pathLst>
-              <a:path w="4818889" h="6858000">
+              <a:path w="4167271" h="6858000">
                 <a:moveTo>
                   <a:pt x="0" y="0"/>
                 </a:moveTo>
                 <a:lnTo>
-                  <a:pt x="3605911" y="0"/>
+                  <a:pt x="2259550" y="0"/>
                 </a:lnTo>
                 <a:lnTo>
-                  <a:pt x="3668894" y="69271"/>
+                  <a:pt x="2387803" y="82222"/>
                 </a:lnTo>
                 <a:cubicBezTo>
-                  <a:pt x="4379420" y="929100"/>
-                  <a:pt x="4818889" y="2116944"/>
-                  <a:pt x="4818889" y="3429000"/>
+                  <a:pt x="3461407" y="807534"/>
+                  <a:pt x="4167271" y="2035835"/>
+                  <a:pt x="4167271" y="3429000"/>
                 </a:cubicBezTo>
                 <a:cubicBezTo>
-                  <a:pt x="4818889" y="4741056"/>
-                  <a:pt x="4379420" y="5928900"/>
-                  <a:pt x="3668894" y="6788730"/>
+                  <a:pt x="4167271" y="4822165"/>
+                  <a:pt x="3461407" y="6050467"/>
+                  <a:pt x="2387803" y="6775779"/>
                 </a:cubicBezTo>
                 <a:lnTo>
-                  <a:pt x="3605911" y="6858000"/>
+                  <a:pt x="2259550" y="6858000"/>
                 </a:lnTo>
                 <a:lnTo>
                   <a:pt x="0" y="6858000"/>
@@ -30387,299 +31455,6 @@
               </a:path>
             </a:pathLst>
           </a:custGeom>
-          <a:ln w="9525">
-            <a:solidFill>
-              <a:srgbClr val="E6E6E6"/>
-            </a:solidFill>
-          </a:ln>
-          <a:effectLst>
-            <a:outerShdw blurRad="50800" dist="38100" algn="l" rotWithShape="0">
-              <a:schemeClr val="bg1">
-                <a:lumMod val="85000"/>
-                <a:alpha val="50000"/>
-              </a:schemeClr>
-            </a:outerShdw>
-          </a:effectLst>
-        </p:spPr>
-        <p:style>
-          <a:lnRef idx="2">
-            <a:schemeClr val="accent1">
-              <a:shade val="50000"/>
-            </a:schemeClr>
-          </a:lnRef>
-          <a:fillRef idx="1">
-            <a:schemeClr val="accent1"/>
-          </a:fillRef>
-          <a:effectRef idx="0">
-            <a:schemeClr val="accent1"/>
-          </a:effectRef>
-          <a:fontRef idx="minor">
-            <a:schemeClr val="lt1"/>
-          </a:fontRef>
-        </p:style>
-        <p:txBody>
-          <a:bodyPr wrap="square" rtlCol="0" anchor="ctr">
-            <a:noAutofit/>
-          </a:bodyPr>
-          <a:lstStyle/>
-          <a:p>
-            <a:pPr marL="0" marR="0" lvl="0" indent="0" algn="ctr" defTabSz="914400" rtl="0" eaLnBrk="1" fontAlgn="auto" latinLnBrk="0" hangingPunct="1">
-              <a:lnSpc>
-                <a:spcPct val="100000"/>
-              </a:lnSpc>
-              <a:spcBef>
-                <a:spcPts val="0"/>
-              </a:spcBef>
-              <a:spcAft>
-                <a:spcPts val="0"/>
-              </a:spcAft>
-              <a:buClrTx/>
-              <a:buSzTx/>
-              <a:buFontTx/>
-              <a:buNone/>
-              <a:tabLst/>
-              <a:defRPr/>
-            </a:pPr>
-            <a:endParaRPr kumimoji="0" lang="en-US" sz="1800" b="0" i="0" u="none" strike="noStrike" kern="1200" cap="none" spc="0" normalizeH="0" baseline="0" noProof="0">
-              <a:ln>
-                <a:noFill/>
-              </a:ln>
-              <a:solidFill>
-                <a:prstClr val="white"/>
-              </a:solidFill>
-              <a:effectLst/>
-              <a:uLnTx/>
-              <a:uFillTx/>
-              <a:latin typeface="Calibri" panose="020F0502020204030204"/>
-              <a:ea typeface="+mn-ea"/>
-              <a:cs typeface="+mn-cs"/>
-            </a:endParaRPr>
-          </a:p>
-        </p:txBody>
-      </p:sp>
-      <p:sp useBgFill="1">
-        <p:nvSpPr>
-          <p:cNvPr id="12" name="Freeform: Shape 11">
-            <a:extLst>
-              <a:ext uri="{FF2B5EF4-FFF2-40B4-BE49-F238E27FC236}">
-                <a16:creationId xmlns:a16="http://schemas.microsoft.com/office/drawing/2014/main" id="{E1B96AD6-92A9-4273-A62B-96A1C3E0BA95}"/>
-              </a:ext>
-              <a:ext uri="{C183D7F6-B498-43B3-948B-1728B52AA6E4}">
-                <adec:decorative xmlns:adec="http://schemas.microsoft.com/office/drawing/2017/decorative" val="1"/>
-              </a:ext>
-            </a:extLst>
-          </p:cNvPr>
-          <p:cNvSpPr>
-            <a:spLocks noGrp="1" noRot="1" noChangeAspect="1" noMove="1" noResize="1" noEditPoints="1" noAdjustHandles="1" noChangeArrowheads="1" noChangeShapeType="1" noTextEdit="1"/>
-          </p:cNvSpPr>
-          <p:nvPr>
-            <p:extLst>
-              <p:ext uri="{386F3935-93C4-4BCD-93E2-E3B085C9AB24}">
-                <p16:designElem xmlns:p16="http://schemas.microsoft.com/office/powerpoint/2015/main" val="1"/>
-              </p:ext>
-            </p:extLst>
-          </p:nvPr>
-        </p:nvSpPr>
-        <p:spPr>
-          <a:xfrm>
-            <a:off x="0" y="0"/>
-            <a:ext cx="3608608" cy="6858000"/>
-          </a:xfrm>
-          <a:custGeom>
-            <a:avLst/>
-            <a:gdLst>
-              <a:gd name="connsiteX0" fmla="*/ 0 w 4811477"/>
-              <a:gd name="connsiteY0" fmla="*/ 0 h 6858000"/>
-              <a:gd name="connsiteX1" fmla="*/ 3598499 w 4811477"/>
-              <a:gd name="connsiteY1" fmla="*/ 0 h 6858000"/>
-              <a:gd name="connsiteX2" fmla="*/ 3661482 w 4811477"/>
-              <a:gd name="connsiteY2" fmla="*/ 69271 h 6858000"/>
-              <a:gd name="connsiteX3" fmla="*/ 4811477 w 4811477"/>
-              <a:gd name="connsiteY3" fmla="*/ 3429000 h 6858000"/>
-              <a:gd name="connsiteX4" fmla="*/ 3661482 w 4811477"/>
-              <a:gd name="connsiteY4" fmla="*/ 6788730 h 6858000"/>
-              <a:gd name="connsiteX5" fmla="*/ 3598499 w 4811477"/>
-              <a:gd name="connsiteY5" fmla="*/ 6858000 h 6858000"/>
-              <a:gd name="connsiteX6" fmla="*/ 0 w 4811477"/>
-              <a:gd name="connsiteY6" fmla="*/ 6858000 h 6858000"/>
-            </a:gdLst>
-            <a:ahLst/>
-            <a:cxnLst>
-              <a:cxn ang="0">
-                <a:pos x="connsiteX0" y="connsiteY0"/>
-              </a:cxn>
-              <a:cxn ang="0">
-                <a:pos x="connsiteX1" y="connsiteY1"/>
-              </a:cxn>
-              <a:cxn ang="0">
-                <a:pos x="connsiteX2" y="connsiteY2"/>
-              </a:cxn>
-              <a:cxn ang="0">
-                <a:pos x="connsiteX3" y="connsiteY3"/>
-              </a:cxn>
-              <a:cxn ang="0">
-                <a:pos x="connsiteX4" y="connsiteY4"/>
-              </a:cxn>
-              <a:cxn ang="0">
-                <a:pos x="connsiteX5" y="connsiteY5"/>
-              </a:cxn>
-              <a:cxn ang="0">
-                <a:pos x="connsiteX6" y="connsiteY6"/>
-              </a:cxn>
-            </a:cxnLst>
-            <a:rect l="l" t="t" r="r" b="b"/>
-            <a:pathLst>
-              <a:path w="4811477" h="6858000">
-                <a:moveTo>
-                  <a:pt x="0" y="0"/>
-                </a:moveTo>
-                <a:lnTo>
-                  <a:pt x="3598499" y="0"/>
-                </a:lnTo>
-                <a:lnTo>
-                  <a:pt x="3661482" y="69271"/>
-                </a:lnTo>
-                <a:cubicBezTo>
-                  <a:pt x="4372008" y="929100"/>
-                  <a:pt x="4811477" y="2116944"/>
-                  <a:pt x="4811477" y="3429000"/>
-                </a:cubicBezTo>
-                <a:cubicBezTo>
-                  <a:pt x="4811477" y="4741056"/>
-                  <a:pt x="4372008" y="5928900"/>
-                  <a:pt x="3661482" y="6788730"/>
-                </a:cubicBezTo>
-                <a:lnTo>
-                  <a:pt x="3598499" y="6858000"/>
-                </a:lnTo>
-                <a:lnTo>
-                  <a:pt x="0" y="6858000"/>
-                </a:lnTo>
-                <a:close/>
-              </a:path>
-            </a:pathLst>
-          </a:custGeom>
-          <a:ln w="9525">
-            <a:noFill/>
-          </a:ln>
-          <a:effectLst/>
-        </p:spPr>
-        <p:style>
-          <a:lnRef idx="2">
-            <a:schemeClr val="accent1">
-              <a:shade val="50000"/>
-            </a:schemeClr>
-          </a:lnRef>
-          <a:fillRef idx="1">
-            <a:schemeClr val="accent1"/>
-          </a:fillRef>
-          <a:effectRef idx="0">
-            <a:schemeClr val="accent1"/>
-          </a:effectRef>
-          <a:fontRef idx="minor">
-            <a:schemeClr val="lt1"/>
-          </a:fontRef>
-        </p:style>
-        <p:txBody>
-          <a:bodyPr wrap="square" rtlCol="0" anchor="ctr">
-            <a:noAutofit/>
-          </a:bodyPr>
-          <a:lstStyle/>
-          <a:p>
-            <a:pPr marL="0" marR="0" lvl="0" indent="0" algn="ctr" defTabSz="914400" rtl="0" eaLnBrk="1" fontAlgn="auto" latinLnBrk="0" hangingPunct="1">
-              <a:lnSpc>
-                <a:spcPct val="100000"/>
-              </a:lnSpc>
-              <a:spcBef>
-                <a:spcPts val="0"/>
-              </a:spcBef>
-              <a:spcAft>
-                <a:spcPts val="0"/>
-              </a:spcAft>
-              <a:buClrTx/>
-              <a:buSzTx/>
-              <a:buFontTx/>
-              <a:buNone/>
-              <a:tabLst/>
-              <a:defRPr/>
-            </a:pPr>
-            <a:endParaRPr kumimoji="0" lang="en-US" sz="1800" b="0" i="0" u="none" strike="noStrike" kern="1200" cap="none" spc="0" normalizeH="0" baseline="0" noProof="0">
-              <a:ln>
-                <a:noFill/>
-              </a:ln>
-              <a:solidFill>
-                <a:prstClr val="white"/>
-              </a:solidFill>
-              <a:effectLst/>
-              <a:uLnTx/>
-              <a:uFillTx/>
-              <a:latin typeface="Calibri" panose="020F0502020204030204"/>
-              <a:ea typeface="+mn-ea"/>
-              <a:cs typeface="+mn-cs"/>
-            </a:endParaRPr>
-          </a:p>
-        </p:txBody>
-      </p:sp>
-      <p:sp>
-        <p:nvSpPr>
-          <p:cNvPr id="2" name="Title 1"/>
-          <p:cNvSpPr>
-            <a:spLocks noGrp="1"/>
-          </p:cNvSpPr>
-          <p:nvPr>
-            <p:ph type="title"/>
-          </p:nvPr>
-        </p:nvSpPr>
-        <p:spPr>
-          <a:xfrm>
-            <a:off x="466344" y="1161288"/>
-            <a:ext cx="2702052" cy="4526280"/>
-          </a:xfrm>
-        </p:spPr>
-        <p:txBody>
-          <a:bodyPr>
-            <a:normAutofit/>
-          </a:bodyPr>
-          <a:lstStyle/>
-          <a:p>
-            <a:r>
-              <a:rPr lang="en-US" sz="3500"/>
-              <a:t>Laying the Foundation with a Relational Model</a:t>
-            </a:r>
-          </a:p>
-        </p:txBody>
-      </p:sp>
-      <p:sp>
-        <p:nvSpPr>
-          <p:cNvPr id="14" name="Rectangle 13">
-            <a:extLst>
-              <a:ext uri="{FF2B5EF4-FFF2-40B4-BE49-F238E27FC236}">
-                <a16:creationId xmlns:a16="http://schemas.microsoft.com/office/drawing/2014/main" id="{463EEC44-1BA3-44ED-81FC-A644B04B2A44}"/>
-              </a:ext>
-              <a:ext uri="{C183D7F6-B498-43B3-948B-1728B52AA6E4}">
-                <adec:decorative xmlns:adec="http://schemas.microsoft.com/office/drawing/2017/decorative" val="1"/>
-              </a:ext>
-            </a:extLst>
-          </p:cNvPr>
-          <p:cNvSpPr>
-            <a:spLocks noGrp="1" noRot="1" noChangeAspect="1" noMove="1" noResize="1" noEditPoints="1" noAdjustHandles="1" noChangeArrowheads="1" noChangeShapeType="1" noTextEdit="1"/>
-          </p:cNvSpPr>
-          <p:nvPr>
-            <p:extLst>
-              <p:ext uri="{386F3935-93C4-4BCD-93E2-E3B085C9AB24}">
-                <p16:designElem xmlns:p16="http://schemas.microsoft.com/office/powerpoint/2015/main" val="1"/>
-              </p:ext>
-            </p:extLst>
-          </p:nvPr>
-        </p:nvSpPr>
-        <p:spPr>
-          <a:xfrm>
-            <a:off x="0" y="3102049"/>
-            <a:ext cx="96012" cy="653903"/>
-          </a:xfrm>
-          <a:prstGeom prst="rect">
-            <a:avLst/>
-          </a:prstGeom>
           <a:solidFill>
             <a:schemeClr val="accent2"/>
           </a:solidFill>
@@ -30708,12 +31483,101 @@
           <a:lstStyle/>
           <a:p>
             <a:pPr algn="ctr"/>
-            <a:endParaRPr lang="en-US">
-              <a:solidFill>
-                <a:prstClr val="white"/>
-              </a:solidFill>
-              <a:latin typeface="Calibri" panose="020F0502020204030204"/>
-            </a:endParaRPr>
+            <a:endParaRPr lang="en-US"/>
+          </a:p>
+        </p:txBody>
+      </p:sp>
+      <p:sp>
+        <p:nvSpPr>
+          <p:cNvPr id="2" name="Title 1"/>
+          <p:cNvSpPr>
+            <a:spLocks noGrp="1"/>
+          </p:cNvSpPr>
+          <p:nvPr>
+            <p:ph type="title"/>
+          </p:nvPr>
+        </p:nvSpPr>
+        <p:spPr>
+          <a:xfrm>
+            <a:off x="515125" y="1153572"/>
+            <a:ext cx="2400300" cy="4461163"/>
+          </a:xfrm>
+        </p:spPr>
+        <p:txBody>
+          <a:bodyPr>
+            <a:normAutofit/>
+          </a:bodyPr>
+          <a:lstStyle/>
+          <a:p>
+            <a:r>
+              <a:rPr lang="en-US" sz="3700">
+                <a:solidFill>
+                  <a:srgbClr val="FFFFFF"/>
+                </a:solidFill>
+              </a:rPr>
+              <a:t>Laying the Foundation with a Relational Model</a:t>
+            </a:r>
+          </a:p>
+        </p:txBody>
+      </p:sp>
+      <p:sp>
+        <p:nvSpPr>
+          <p:cNvPr id="42" name="Arc 41">
+            <a:extLst>
+              <a:ext uri="{FF2B5EF4-FFF2-40B4-BE49-F238E27FC236}">
+                <a16:creationId xmlns:a16="http://schemas.microsoft.com/office/drawing/2014/main" id="{081E4A58-353D-44AE-B2FC-2A74E2E400F7}"/>
+              </a:ext>
+              <a:ext uri="{C183D7F6-B498-43B3-948B-1728B52AA6E4}">
+                <adec:decorative xmlns:adec="http://schemas.microsoft.com/office/drawing/2017/decorative" val="1"/>
+              </a:ext>
+            </a:extLst>
+          </p:cNvPr>
+          <p:cNvSpPr>
+            <a:spLocks noGrp="1" noRot="1" noChangeAspect="1" noMove="1" noResize="1" noEditPoints="1" noAdjustHandles="1" noChangeArrowheads="1" noChangeShapeType="1" noTextEdit="1"/>
+          </p:cNvSpPr>
+          <p:nvPr>
+            <p:extLst>
+              <p:ext uri="{386F3935-93C4-4BCD-93E2-E3B085C9AB24}">
+                <p16:designElem xmlns:p16="http://schemas.microsoft.com/office/powerpoint/2015/main" val="1"/>
+              </p:ext>
+            </p:extLst>
+          </p:nvPr>
+        </p:nvSpPr>
+        <p:spPr>
+          <a:xfrm flipV="1">
+            <a:off x="5662801" y="2455479"/>
+            <a:ext cx="3062575" cy="4083433"/>
+          </a:xfrm>
+          <a:prstGeom prst="arc">
+            <a:avLst/>
+          </a:prstGeom>
+          <a:ln w="127000" cap="rnd">
+            <a:solidFill>
+              <a:schemeClr val="accent4"/>
+            </a:solidFill>
+            <a:prstDash val="dash"/>
+          </a:ln>
+        </p:spPr>
+        <p:style>
+          <a:lnRef idx="1">
+            <a:schemeClr val="accent1"/>
+          </a:lnRef>
+          <a:fillRef idx="0">
+            <a:schemeClr val="accent1"/>
+          </a:fillRef>
+          <a:effectRef idx="0">
+            <a:schemeClr val="accent1"/>
+          </a:effectRef>
+          <a:fontRef idx="minor">
+            <a:schemeClr val="tx1"/>
+          </a:fontRef>
+        </p:style>
+        <p:txBody>
+          <a:bodyPr rtlCol="0" anchor="ctr"/>
+          <a:lstStyle/>
+          <a:p>
+            <a:pPr algn="ctr"/>
+            <a:endParaRPr lang="en-US" dirty="0"/>
           </a:p>
         </p:txBody>
       </p:sp>
@@ -30729,8 +31593,8 @@
         </p:nvSpPr>
         <p:spPr>
           <a:xfrm>
-            <a:off x="4075611" y="932688"/>
-            <a:ext cx="4437453" cy="4992624"/>
+            <a:off x="3890075" y="591344"/>
+            <a:ext cx="4625274" cy="4538595"/>
           </a:xfrm>
         </p:spPr>
         <p:txBody>
@@ -30743,10 +31607,7 @@
               <a:buFont typeface="Arial" panose="020B0604020202020204" pitchFamily="34" charset="0"/>
               <a:buChar char="•"/>
             </a:pPr>
-            <a:r>
-              <a:rPr lang="en-US" sz="1700"/>
-              <a:t>The relational model </a:t>
-            </a:r>
+            <a:endParaRPr lang="en-US" dirty="0"/>
           </a:p>
           <a:p>
             <a:pPr>
@@ -30754,9 +31615,15 @@
               <a:buChar char="•"/>
             </a:pPr>
             <a:r>
-              <a:rPr lang="en-US" sz="1700"/>
-              <a:t>Tables</a:t>
-            </a:r>
+              <a:rPr lang="en-US" dirty="0"/>
+              <a:t>The relational model </a:t>
+            </a:r>
+          </a:p>
+          <a:p>
+            <a:pPr marL="0" indent="0">
+              <a:buNone/>
+            </a:pPr>
+            <a:endParaRPr lang="en-US" dirty="0"/>
           </a:p>
           <a:p>
             <a:pPr>
@@ -30764,7 +31631,23 @@
               <a:buChar char="•"/>
             </a:pPr>
             <a:r>
-              <a:rPr lang="en-US" sz="1700"/>
+              <a:rPr lang="en-US" dirty="0"/>
+              <a:t>Tables</a:t>
+            </a:r>
+          </a:p>
+          <a:p>
+            <a:pPr marL="0" indent="0">
+              <a:buNone/>
+            </a:pPr>
+            <a:endParaRPr lang="en-US" dirty="0"/>
+          </a:p>
+          <a:p>
+            <a:pPr>
+              <a:buFont typeface="Arial" panose="020B0604020202020204" pitchFamily="34" charset="0"/>
+              <a:buChar char="•"/>
+            </a:pPr>
+            <a:r>
+              <a:rPr lang="en-US" dirty="0"/>
               <a:t>Primary Keys</a:t>
             </a:r>
           </a:p>
@@ -30995,8 +31878,8 @@
         </p:blipFill>
         <p:spPr>
           <a:xfrm>
-            <a:off x="-1217613" y="0"/>
-            <a:ext cx="10615613" cy="7281435"/>
+            <a:off x="-569442" y="-111211"/>
+            <a:ext cx="10615613" cy="7842048"/>
           </a:xfrm>
         </p:spPr>
       </p:pic>

</xml_diff>